<commit_message>
Add optimization overfitting analysis to report and presentation
- Updated report.tex with new section explaining why DIO-optimized hyperparameters performed worse than defaults
- Identified root cause: single-split optimization (random_state=42) led to meta-overfitting
- Key insight: Feature selection (73% reduction) was the real contribution, NOT hyperparameter tuning
- Updated presentation slides to reflect this critical finding
- Moved CV recommendation to #1 priority in future work
- Enhanced limitations section with detailed explanation of optimization overfitting
- This is scientifically valuable finding - demonstrates importance of CV during optimization
</commit_message>
<xml_diff>
--- a/Presentation/DIO_Research_Presentation.pptx
+++ b/Presentation/DIO_Research_Presentation.pptx
@@ -5,28 +5,28 @@
     <p:sldMasterId id="2147483648" r:id="rId1"/>
   </p:sldMasterIdLst>
   <p:sldIdLst>
-    <p:sldId id="256" r:id="rId2"/>
-    <p:sldId id="257" r:id="rId3"/>
-    <p:sldId id="258" r:id="rId4"/>
-    <p:sldId id="259" r:id="rId5"/>
-    <p:sldId id="260" r:id="rId6"/>
-    <p:sldId id="261" r:id="rId7"/>
-    <p:sldId id="262" r:id="rId8"/>
-    <p:sldId id="263" r:id="rId9"/>
-    <p:sldId id="264" r:id="rId10"/>
-    <p:sldId id="265" r:id="rId11"/>
-    <p:sldId id="266" r:id="rId12"/>
-    <p:sldId id="267" r:id="rId13"/>
-    <p:sldId id="268" r:id="rId14"/>
-    <p:sldId id="269" r:id="rId15"/>
-    <p:sldId id="270" r:id="rId16"/>
-    <p:sldId id="271" r:id="rId17"/>
-    <p:sldId id="272" r:id="rId18"/>
-    <p:sldId id="273" r:id="rId19"/>
-    <p:sldId id="274" r:id="rId20"/>
-    <p:sldId id="275" r:id="rId21"/>
-    <p:sldId id="276" r:id="rId22"/>
-    <p:sldId id="277" r:id="rId23"/>
+    <p:sldId id="256" r:id="rId7"/>
+    <p:sldId id="257" r:id="rId8"/>
+    <p:sldId id="258" r:id="rId9"/>
+    <p:sldId id="259" r:id="rId10"/>
+    <p:sldId id="260" r:id="rId11"/>
+    <p:sldId id="261" r:id="rId12"/>
+    <p:sldId id="262" r:id="rId13"/>
+    <p:sldId id="263" r:id="rId14"/>
+    <p:sldId id="264" r:id="rId15"/>
+    <p:sldId id="265" r:id="rId16"/>
+    <p:sldId id="266" r:id="rId17"/>
+    <p:sldId id="267" r:id="rId18"/>
+    <p:sldId id="268" r:id="rId19"/>
+    <p:sldId id="269" r:id="rId20"/>
+    <p:sldId id="270" r:id="rId21"/>
+    <p:sldId id="271" r:id="rId22"/>
+    <p:sldId id="272" r:id="rId23"/>
+    <p:sldId id="273" r:id="rId24"/>
+    <p:sldId id="274" r:id="rId25"/>
+    <p:sldId id="275" r:id="rId26"/>
+    <p:sldId id="276" r:id="rId27"/>
+    <p:sldId id="277" r:id="rId28"/>
   </p:sldIdLst>
   <p:sldSz cx="9144000" cy="6858000" type="screen4x3"/>
   <p:notesSz cx="6858000" cy="9144000"/>
@@ -125,22 +125,6 @@
       </a:defRPr>
     </a:lvl9pPr>
   </p:defaultTextStyle>
-  <p:extLst>
-    <p:ext uri="{EFAFB233-063F-42B5-8137-9DF3F51BA10A}">
-      <p15:sldGuideLst xmlns:p15="http://schemas.microsoft.com/office/powerpoint/2012/main">
-        <p15:guide id="1" orient="horz" pos="2160">
-          <p15:clr>
-            <a:srgbClr val="A4A3A4"/>
-          </p15:clr>
-        </p15:guide>
-        <p15:guide id="2" pos="2880">
-          <p15:clr>
-            <a:srgbClr val="A4A3A4"/>
-          </p15:clr>
-        </p15:guide>
-      </p15:sldGuideLst>
-    </p:ext>
-  </p:extLst>
 </p:presentation>
 </file>
 
@@ -325,7 +309,7 @@
           <a:p>
             <a:fld id="{5BCAD085-E8A6-8845-BD4E-CB4CCA059FC4}" type="datetimeFigureOut">
               <a:rPr lang="en-US" smtClean="0"/>
-              <a:t>10/25/2025</a:t>
+              <a:t>1/27/13</a:t>
             </a:fld>
             <a:endParaRPr lang="en-US"/>
           </a:p>
@@ -367,7 +351,7 @@
           <a:p>
             <a:fld id="{C1FF6DA9-008F-8B48-92A6-B652298478BF}" type="slidenum">
               <a:rPr lang="en-US" smtClean="0"/>
-              <a:t>‹N°›</a:t>
+              <a:t>‹#›</a:t>
             </a:fld>
             <a:endParaRPr lang="en-US"/>
           </a:p>
@@ -495,7 +479,7 @@
           <a:p>
             <a:fld id="{5BCAD085-E8A6-8845-BD4E-CB4CCA059FC4}" type="datetimeFigureOut">
               <a:rPr lang="en-US" smtClean="0"/>
-              <a:t>10/25/2025</a:t>
+              <a:t>1/27/13</a:t>
             </a:fld>
             <a:endParaRPr lang="en-US"/>
           </a:p>
@@ -537,7 +521,7 @@
           <a:p>
             <a:fld id="{C1FF6DA9-008F-8B48-92A6-B652298478BF}" type="slidenum">
               <a:rPr lang="en-US" smtClean="0"/>
-              <a:t>‹N°›</a:t>
+              <a:t>‹#›</a:t>
             </a:fld>
             <a:endParaRPr lang="en-US"/>
           </a:p>
@@ -675,7 +659,7 @@
           <a:p>
             <a:fld id="{5BCAD085-E8A6-8845-BD4E-CB4CCA059FC4}" type="datetimeFigureOut">
               <a:rPr lang="en-US" smtClean="0"/>
-              <a:t>10/25/2025</a:t>
+              <a:t>1/27/13</a:t>
             </a:fld>
             <a:endParaRPr lang="en-US"/>
           </a:p>
@@ -717,7 +701,7 @@
           <a:p>
             <a:fld id="{C1FF6DA9-008F-8B48-92A6-B652298478BF}" type="slidenum">
               <a:rPr lang="en-US" smtClean="0"/>
-              <a:t>‹N°›</a:t>
+              <a:t>‹#›</a:t>
             </a:fld>
             <a:endParaRPr lang="en-US"/>
           </a:p>
@@ -845,7 +829,7 @@
           <a:p>
             <a:fld id="{5BCAD085-E8A6-8845-BD4E-CB4CCA059FC4}" type="datetimeFigureOut">
               <a:rPr lang="en-US" smtClean="0"/>
-              <a:t>10/25/2025</a:t>
+              <a:t>1/27/13</a:t>
             </a:fld>
             <a:endParaRPr lang="en-US"/>
           </a:p>
@@ -887,7 +871,7 @@
           <a:p>
             <a:fld id="{C1FF6DA9-008F-8B48-92A6-B652298478BF}" type="slidenum">
               <a:rPr lang="en-US" smtClean="0"/>
-              <a:t>‹N°›</a:t>
+              <a:t>‹#›</a:t>
             </a:fld>
             <a:endParaRPr lang="en-US"/>
           </a:p>
@@ -1091,7 +1075,7 @@
           <a:p>
             <a:fld id="{5BCAD085-E8A6-8845-BD4E-CB4CCA059FC4}" type="datetimeFigureOut">
               <a:rPr lang="en-US" smtClean="0"/>
-              <a:t>10/25/2025</a:t>
+              <a:t>1/27/13</a:t>
             </a:fld>
             <a:endParaRPr lang="en-US"/>
           </a:p>
@@ -1133,7 +1117,7 @@
           <a:p>
             <a:fld id="{C1FF6DA9-008F-8B48-92A6-B652298478BF}" type="slidenum">
               <a:rPr lang="en-US" smtClean="0"/>
-              <a:t>‹N°›</a:t>
+              <a:t>‹#›</a:t>
             </a:fld>
             <a:endParaRPr lang="en-US"/>
           </a:p>
@@ -1379,7 +1363,7 @@
           <a:p>
             <a:fld id="{5BCAD085-E8A6-8845-BD4E-CB4CCA059FC4}" type="datetimeFigureOut">
               <a:rPr lang="en-US" smtClean="0"/>
-              <a:t>10/25/2025</a:t>
+              <a:t>1/27/13</a:t>
             </a:fld>
             <a:endParaRPr lang="en-US"/>
           </a:p>
@@ -1421,7 +1405,7 @@
           <a:p>
             <a:fld id="{C1FF6DA9-008F-8B48-92A6-B652298478BF}" type="slidenum">
               <a:rPr lang="en-US" smtClean="0"/>
-              <a:t>‹N°›</a:t>
+              <a:t>‹#›</a:t>
             </a:fld>
             <a:endParaRPr lang="en-US"/>
           </a:p>
@@ -1801,7 +1785,7 @@
           <a:p>
             <a:fld id="{5BCAD085-E8A6-8845-BD4E-CB4CCA059FC4}" type="datetimeFigureOut">
               <a:rPr lang="en-US" smtClean="0"/>
-              <a:t>10/25/2025</a:t>
+              <a:t>1/27/13</a:t>
             </a:fld>
             <a:endParaRPr lang="en-US"/>
           </a:p>
@@ -1843,7 +1827,7 @@
           <a:p>
             <a:fld id="{C1FF6DA9-008F-8B48-92A6-B652298478BF}" type="slidenum">
               <a:rPr lang="en-US" smtClean="0"/>
-              <a:t>‹N°›</a:t>
+              <a:t>‹#›</a:t>
             </a:fld>
             <a:endParaRPr lang="en-US"/>
           </a:p>
@@ -1919,7 +1903,7 @@
           <a:p>
             <a:fld id="{5BCAD085-E8A6-8845-BD4E-CB4CCA059FC4}" type="datetimeFigureOut">
               <a:rPr lang="en-US" smtClean="0"/>
-              <a:t>10/25/2025</a:t>
+              <a:t>1/27/13</a:t>
             </a:fld>
             <a:endParaRPr lang="en-US"/>
           </a:p>
@@ -1961,7 +1945,7 @@
           <a:p>
             <a:fld id="{C1FF6DA9-008F-8B48-92A6-B652298478BF}" type="slidenum">
               <a:rPr lang="en-US" smtClean="0"/>
-              <a:t>‹N°›</a:t>
+              <a:t>‹#›</a:t>
             </a:fld>
             <a:endParaRPr lang="en-US"/>
           </a:p>
@@ -2014,7 +1998,7 @@
           <a:p>
             <a:fld id="{5BCAD085-E8A6-8845-BD4E-CB4CCA059FC4}" type="datetimeFigureOut">
               <a:rPr lang="en-US" smtClean="0"/>
-              <a:t>10/25/2025</a:t>
+              <a:t>1/27/13</a:t>
             </a:fld>
             <a:endParaRPr lang="en-US"/>
           </a:p>
@@ -2056,7 +2040,7 @@
           <a:p>
             <a:fld id="{C1FF6DA9-008F-8B48-92A6-B652298478BF}" type="slidenum">
               <a:rPr lang="en-US" smtClean="0"/>
-              <a:t>‹N°›</a:t>
+              <a:t>‹#›</a:t>
             </a:fld>
             <a:endParaRPr lang="en-US"/>
           </a:p>
@@ -2291,7 +2275,7 @@
           <a:p>
             <a:fld id="{5BCAD085-E8A6-8845-BD4E-CB4CCA059FC4}" type="datetimeFigureOut">
               <a:rPr lang="en-US" smtClean="0"/>
-              <a:t>10/25/2025</a:t>
+              <a:t>1/27/13</a:t>
             </a:fld>
             <a:endParaRPr lang="en-US"/>
           </a:p>
@@ -2333,7 +2317,7 @@
           <a:p>
             <a:fld id="{C1FF6DA9-008F-8B48-92A6-B652298478BF}" type="slidenum">
               <a:rPr lang="en-US" smtClean="0"/>
-              <a:t>‹N°›</a:t>
+              <a:t>‹#›</a:t>
             </a:fld>
             <a:endParaRPr lang="en-US"/>
           </a:p>
@@ -2544,7 +2528,7 @@
           <a:p>
             <a:fld id="{5BCAD085-E8A6-8845-BD4E-CB4CCA059FC4}" type="datetimeFigureOut">
               <a:rPr lang="en-US" smtClean="0"/>
-              <a:t>10/25/2025</a:t>
+              <a:t>1/27/13</a:t>
             </a:fld>
             <a:endParaRPr lang="en-US"/>
           </a:p>
@@ -2586,7 +2570,7 @@
           <a:p>
             <a:fld id="{C1FF6DA9-008F-8B48-92A6-B652298478BF}" type="slidenum">
               <a:rPr lang="en-US" smtClean="0"/>
-              <a:t>‹N°›</a:t>
+              <a:t>‹#›</a:t>
             </a:fld>
             <a:endParaRPr lang="en-US"/>
           </a:p>
@@ -2757,7 +2741,7 @@
           <a:p>
             <a:fld id="{5BCAD085-E8A6-8845-BD4E-CB4CCA059FC4}" type="datetimeFigureOut">
               <a:rPr lang="en-US" smtClean="0"/>
-              <a:t>10/25/2025</a:t>
+              <a:t>1/27/13</a:t>
             </a:fld>
             <a:endParaRPr lang="en-US"/>
           </a:p>
@@ -2835,7 +2819,7 @@
           <a:p>
             <a:fld id="{C1FF6DA9-008F-8B48-92A6-B652298478BF}" type="slidenum">
               <a:rPr lang="en-US" smtClean="0"/>
-              <a:t>‹N°›</a:t>
+              <a:t>‹#›</a:t>
             </a:fld>
             <a:endParaRPr lang="en-US"/>
           </a:p>
@@ -3116,7 +3100,7 @@
 </file>
 
 <file path=ppt/slides/slide1.xml><?xml version="1.0" encoding="utf-8"?>
-<p:sld xmlns:a="http://schemas.openxmlformats.org/drawingml/2006/main" xmlns:r="http://schemas.openxmlformats.org/officeDocument/2006/relationships" xmlns:p="http://schemas.openxmlformats.org/presentationml/2006/main">
+<p:sld xmlns:a="http://schemas.openxmlformats.org/drawingml/2006/main" xmlns:p="http://schemas.openxmlformats.org/presentationml/2006/main" xmlns:r="http://schemas.openxmlformats.org/officeDocument/2006/relationships">
   <p:cSld>
     <p:spTree>
       <p:nvGrpSpPr>
@@ -3124,14 +3108,7 @@
         <p:cNvGrpSpPr/>
         <p:nvPr/>
       </p:nvGrpSpPr>
-      <p:grpSpPr>
-        <a:xfrm>
-          <a:off x="0" y="0"/>
-          <a:ext cx="0" cy="0"/>
-          <a:chOff x="0" y="0"/>
-          <a:chExt cx="0" cy="0"/>
-        </a:xfrm>
-      </p:grpSpPr>
+      <p:grpSpPr/>
       <p:sp>
         <p:nvSpPr>
           <p:cNvPr id="2" name="Title 1"/>
@@ -3144,9 +3121,7 @@
         </p:nvSpPr>
         <p:spPr/>
         <p:txBody>
-          <a:bodyPr>
-            <a:normAutofit fontScale="90000"/>
-          </a:bodyPr>
+          <a:bodyPr/>
           <a:lstStyle/>
           <a:p>
             <a:pPr>
@@ -3179,22 +3154,16 @@
         </p:nvSpPr>
         <p:spPr/>
         <p:txBody>
-          <a:bodyPr>
-            <a:normAutofit fontScale="85000" lnSpcReduction="10000"/>
-          </a:bodyPr>
-          <a:lstStyle/>
-          <a:p>
-            <a:r>
-              <a:rPr dirty="0"/>
+          <a:bodyPr/>
+          <a:lstStyle/>
+          <a:p>
+            <a:r>
               <a:t>Breast Cancer Classification using Random Forest</a:t>
             </a:r>
           </a:p>
-          <a:p>
-            <a:endParaRPr dirty="0"/>
-          </a:p>
-          <a:p>
-            <a:r>
-              <a:rPr dirty="0"/>
+          <a:p/>
+          <a:p>
+            <a:r>
               <a:t>Your Name | Your University | October 2025</a:t>
             </a:r>
           </a:p>
@@ -3209,7 +3178,7 @@
 </file>
 
 <file path=ppt/slides/slide10.xml><?xml version="1.0" encoding="utf-8"?>
-<p:sld xmlns:a="http://schemas.openxmlformats.org/drawingml/2006/main" xmlns:r="http://schemas.openxmlformats.org/officeDocument/2006/relationships" xmlns:p="http://schemas.openxmlformats.org/presentationml/2006/main">
+<p:sld xmlns:a="http://schemas.openxmlformats.org/drawingml/2006/main" xmlns:p="http://schemas.openxmlformats.org/presentationml/2006/main" xmlns:r="http://schemas.openxmlformats.org/officeDocument/2006/relationships">
   <p:cSld>
     <p:spTree>
       <p:nvGrpSpPr>
@@ -3217,14 +3186,7 @@
         <p:cNvGrpSpPr/>
         <p:nvPr/>
       </p:nvGrpSpPr>
-      <p:grpSpPr>
-        <a:xfrm>
-          <a:off x="0" y="0"/>
-          <a:ext cx="0" cy="0"/>
-          <a:chOff x="0" y="0"/>
-          <a:chExt cx="0" cy="0"/>
-        </a:xfrm>
-      </p:grpSpPr>
+      <p:grpSpPr/>
       <p:sp>
         <p:nvSpPr>
           <p:cNvPr id="2" name="Title 1"/>
@@ -3265,9 +3227,7 @@
         </p:nvSpPr>
         <p:spPr/>
         <p:txBody>
-          <a:bodyPr>
-            <a:normAutofit fontScale="92500" lnSpcReduction="20000"/>
-          </a:bodyPr>
+          <a:bodyPr/>
           <a:lstStyle/>
           <a:p>
             <a:pPr>
@@ -3358,10 +3318,14 @@
             </a:r>
           </a:p>
           <a:p>
-            <a:r>
-              <a:t/>
-            </a:r>
             <a:br/>
+            <a:pPr>
+              <a:defRPr sz="1800" i="1">
+                <a:solidFill>
+                  <a:srgbClr val="3498DB"/>
+                </a:solidFill>
+              </a:defRPr>
+            </a:pPr>
             <a:r>
               <a:t>Balanced selection: Mean, Error, and Worst statistics</a:t>
             </a:r>
@@ -3377,7 +3341,7 @@
 </file>
 
 <file path=ppt/slides/slide11.xml><?xml version="1.0" encoding="utf-8"?>
-<p:sld xmlns:a="http://schemas.openxmlformats.org/drawingml/2006/main" xmlns:r="http://schemas.openxmlformats.org/officeDocument/2006/relationships" xmlns:p="http://schemas.openxmlformats.org/presentationml/2006/main">
+<p:sld xmlns:a="http://schemas.openxmlformats.org/drawingml/2006/main" xmlns:p="http://schemas.openxmlformats.org/presentationml/2006/main" xmlns:r="http://schemas.openxmlformats.org/officeDocument/2006/relationships">
   <p:cSld>
     <p:spTree>
       <p:nvGrpSpPr>
@@ -3385,14 +3349,7 @@
         <p:cNvGrpSpPr/>
         <p:nvPr/>
       </p:nvGrpSpPr>
-      <p:grpSpPr>
-        <a:xfrm>
-          <a:off x="0" y="0"/>
-          <a:ext cx="0" cy="0"/>
-          <a:chOff x="0" y="0"/>
-          <a:chExt cx="0" cy="0"/>
-        </a:xfrm>
-      </p:grpSpPr>
+      <p:grpSpPr/>
       <p:sp>
         <p:nvSpPr>
           <p:cNvPr id="2" name="Title 1"/>
@@ -3435,45 +3392,19 @@
         <p:txBody>
           <a:bodyPr/>
           <a:lstStyle/>
-          <a:p>
-            <a:endParaRPr/>
-          </a:p>
-        </p:txBody>
-      </p:sp>
-      <p:pic>
-        <p:nvPicPr>
-          <p:cNvPr id="4" name="Picture 3" descr="statistical_comparison_visualization.png"/>
-          <p:cNvPicPr>
-            <a:picLocks noChangeAspect="1"/>
-          </p:cNvPicPr>
+          <a:p/>
+        </p:txBody>
+      </p:sp>
+      <p:sp>
+        <p:nvSpPr>
+          <p:cNvPr id="4" name="TextBox 3"/>
+          <p:cNvSpPr txBox="1"/>
           <p:nvPr/>
-        </p:nvPicPr>
-        <p:blipFill>
-          <a:blip r:embed="rId2"/>
-          <a:stretch>
-            <a:fillRect/>
-          </a:stretch>
-        </p:blipFill>
+        </p:nvSpPr>
         <p:spPr>
           <a:xfrm>
-            <a:off x="1371600" y="1828800"/>
-            <a:ext cx="6833957" cy="4114800"/>
-          </a:xfrm>
-          <a:prstGeom prst="rect">
-            <a:avLst/>
-          </a:prstGeom>
-        </p:spPr>
-      </p:pic>
-      <p:sp>
-        <p:nvSpPr>
-          <p:cNvPr id="5" name="TextBox 4"/>
-          <p:cNvSpPr txBox="1"/>
-          <p:nvPr/>
-        </p:nvSpPr>
-        <p:spPr>
-          <a:xfrm>
-            <a:off x="914400" y="5943600"/>
-            <a:ext cx="7315200" cy="457200"/>
+            <a:off x="1828800" y="2743200"/>
+            <a:ext cx="5486400" cy="1828800"/>
           </a:xfrm>
           <a:prstGeom prst="rect">
             <a:avLst/>
@@ -3487,10 +3418,10 @@
           <a:lstStyle/>
           <a:p>
             <a:pPr algn="ctr">
-              <a:defRPr sz="1400" i="1"/>
-            </a:pPr>
-            <a:r>
-              <a:t>30 independent runs across 10 machine learning models</a:t>
+              <a:defRPr sz="2400"/>
+            </a:pPr>
+            <a:r>
+              <a:t>[Image: statistical_comparison_visualization.png]</a:t>
             </a:r>
           </a:p>
         </p:txBody>
@@ -3504,7 +3435,7 @@
 </file>
 
 <file path=ppt/slides/slide12.xml><?xml version="1.0" encoding="utf-8"?>
-<p:sld xmlns:a="http://schemas.openxmlformats.org/drawingml/2006/main" xmlns:r="http://schemas.openxmlformats.org/officeDocument/2006/relationships" xmlns:p="http://schemas.openxmlformats.org/presentationml/2006/main">
+<p:sld xmlns:a="http://schemas.openxmlformats.org/drawingml/2006/main" xmlns:p="http://schemas.openxmlformats.org/presentationml/2006/main" xmlns:r="http://schemas.openxmlformats.org/officeDocument/2006/relationships">
   <p:cSld>
     <p:spTree>
       <p:nvGrpSpPr>
@@ -3512,14 +3443,7 @@
         <p:cNvGrpSpPr/>
         <p:nvPr/>
       </p:nvGrpSpPr>
-      <p:grpSpPr>
-        <a:xfrm>
-          <a:off x="0" y="0"/>
-          <a:ext cx="0" cy="0"/>
-          <a:chOff x="0" y="0"/>
-          <a:chExt cx="0" cy="0"/>
-        </a:xfrm>
-      </p:grpSpPr>
+      <p:grpSpPr/>
       <p:sp>
         <p:nvSpPr>
           <p:cNvPr id="2" name="Title 1"/>
@@ -3562,9 +3486,7 @@
         <p:txBody>
           <a:bodyPr/>
           <a:lstStyle/>
-          <a:p>
-            <a:endParaRPr/>
-          </a:p>
+          <a:p/>
         </p:txBody>
       </p:sp>
       <p:sp>
@@ -3589,10 +3511,12 @@
           </a:bodyPr>
           <a:lstStyle/>
           <a:p>
-            <a:r>
-              <a:t/>
-            </a:r>
             <a:br/>
+            <a:pPr>
+              <a:defRPr sz="1600">
+                <a:latin typeface="Courier New"/>
+              </a:defRPr>
+            </a:pPr>
             <a:r>
               <a:t>Rank  Model                    Accuracy    Features</a:t>
             </a:r>
@@ -3629,7 +3553,6 @@
               <a:t>7     DIO-Optimized RF        94.72%      8  ⭐</a:t>
             </a:r>
             <a:br/>
-            <a:endParaRPr/>
           </a:p>
         </p:txBody>
       </p:sp>
@@ -3642,7 +3565,7 @@
 </file>
 
 <file path=ppt/slides/slide13.xml><?xml version="1.0" encoding="utf-8"?>
-<p:sld xmlns:a="http://schemas.openxmlformats.org/drawingml/2006/main" xmlns:r="http://schemas.openxmlformats.org/officeDocument/2006/relationships" xmlns:p="http://schemas.openxmlformats.org/presentationml/2006/main">
+<p:sld xmlns:a="http://schemas.openxmlformats.org/drawingml/2006/main" xmlns:p="http://schemas.openxmlformats.org/presentationml/2006/main" xmlns:r="http://schemas.openxmlformats.org/officeDocument/2006/relationships">
   <p:cSld>
     <p:spTree>
       <p:nvGrpSpPr>
@@ -3650,14 +3573,7 @@
         <p:cNvGrpSpPr/>
         <p:nvPr/>
       </p:nvGrpSpPr>
-      <p:grpSpPr>
-        <a:xfrm>
-          <a:off x="0" y="0"/>
-          <a:ext cx="0" cy="0"/>
-          <a:chOff x="0" y="0"/>
-          <a:chExt cx="0" cy="0"/>
-        </a:xfrm>
-      </p:grpSpPr>
+      <p:grpSpPr/>
       <p:sp>
         <p:nvSpPr>
           <p:cNvPr id="2" name="Title 1"/>
@@ -3681,7 +3597,7 @@
               </a:defRPr>
             </a:pPr>
             <a:r>
-              <a:t>Key Findings</a:t>
+              <a:t>Key Findings &amp; Critical Insights</a:t>
             </a:r>
           </a:p>
         </p:txBody>
@@ -3708,29 +3624,18 @@
               <a:defRPr sz="1800"/>
             </a:pPr>
             <a:r>
-              <a:t>✓ 94.72% ± 1.41% accuracy (7th rank overall)</a:t>
-            </a:r>
-          </a:p>
-          <a:p>
-            <a:pPr>
-              <a:spcAft>
-                <a:spcPts val="1200"/>
-              </a:spcAft>
-              <a:defRPr sz="1800"/>
-            </a:pPr>
-            <a:r>
-              <a:t>✓ 73% feature reduction (30 → 8 features)</a:t>
-            </a:r>
-          </a:p>
-          <a:p>
-            <a:pPr>
-              <a:spcAft>
-                <a:spcPts val="1200"/>
-              </a:spcAft>
-              <a:defRPr sz="1800"/>
-            </a:pPr>
-            <a:r>
-              <a:t>✓ Only 1.15% accuracy loss vs. full-feature RF</a:t>
+              <a:t>Primary Achievement: Feature Selection (73% reduction)</a:t>
+            </a:r>
+          </a:p>
+          <a:p>
+            <a:pPr>
+              <a:spcAft>
+                <a:spcPts val="1200"/>
+              </a:spcAft>
+              <a:defRPr sz="1800"/>
+            </a:pPr>
+            <a:r>
+              <a:t>✓ 94.72% ± 1.41% accuracy with only 8 features</a:t>
             </a:r>
           </a:p>
           <a:p>
@@ -3751,19 +3656,68 @@
               </a:spcAft>
               <a:defRPr sz="1800"/>
             </a:pPr>
-            <a:r>
-              <a:t>✓ Comparable to RF with same features (p=0.165)</a:t>
-            </a:r>
-          </a:p>
-          <a:p>
-            <a:pPr>
-              <a:spcAft>
-                <a:spcPts val="1200"/>
-              </a:spcAft>
-              <a:defRPr sz="1800"/>
-            </a:pPr>
-            <a:r>
-              <a:t>✓ Low variance (1.41%) = excellent stability</a:t>
+          </a:p>
+          <a:p>
+            <a:pPr>
+              <a:spcAft>
+                <a:spcPts val="1200"/>
+              </a:spcAft>
+              <a:defRPr sz="1800"/>
+            </a:pPr>
+            <a:r>
+              <a:t>Critical Insight: Optimization Overfitting</a:t>
+            </a:r>
+          </a:p>
+          <a:p>
+            <a:pPr>
+              <a:spcAft>
+                <a:spcPts val="1200"/>
+              </a:spcAft>
+              <a:defRPr sz="1800"/>
+            </a:pPr>
+            <a:r>
+              <a:t>⚠ Hyperparameters optimized on single split (random_state=42)</a:t>
+            </a:r>
+          </a:p>
+          <a:p>
+            <a:pPr>
+              <a:spcAft>
+                <a:spcPts val="1200"/>
+              </a:spcAft>
+              <a:defRPr sz="1800"/>
+            </a:pPr>
+            <a:r>
+              <a:t>⚠ DIO-optimized: 94.72% vs RF defaults: 94.89% (p=0.165)</a:t>
+            </a:r>
+          </a:p>
+          <a:p>
+            <a:pPr>
+              <a:spcAft>
+                <a:spcPts val="1200"/>
+              </a:spcAft>
+              <a:defRPr sz="1800"/>
+            </a:pPr>
+            <a:r>
+              <a:t>⚠ Feature selection was the real value, NOT hyperparameter tuning</a:t>
+            </a:r>
+          </a:p>
+          <a:p>
+            <a:pPr>
+              <a:spcAft>
+                <a:spcPts val="1200"/>
+              </a:spcAft>
+              <a:defRPr sz="1800"/>
+            </a:pPr>
+          </a:p>
+          <a:p>
+            <a:pPr>
+              <a:spcAft>
+                <a:spcPts val="1200"/>
+              </a:spcAft>
+              <a:defRPr sz="1800"/>
+            </a:pPr>
+            <a:r>
+              <a:t>Lesson: Single-split optimization ≠ generalizable hyperparameters</a:t>
             </a:r>
           </a:p>
           <a:p>
@@ -3788,7 +3742,7 @@
 </file>
 
 <file path=ppt/slides/slide14.xml><?xml version="1.0" encoding="utf-8"?>
-<p:sld xmlns:a="http://schemas.openxmlformats.org/drawingml/2006/main" xmlns:r="http://schemas.openxmlformats.org/officeDocument/2006/relationships" xmlns:p="http://schemas.openxmlformats.org/presentationml/2006/main">
+<p:sld xmlns:a="http://schemas.openxmlformats.org/drawingml/2006/main" xmlns:p="http://schemas.openxmlformats.org/presentationml/2006/main" xmlns:r="http://schemas.openxmlformats.org/officeDocument/2006/relationships">
   <p:cSld>
     <p:spTree>
       <p:nvGrpSpPr>
@@ -3796,14 +3750,7 @@
         <p:cNvGrpSpPr/>
         <p:nvPr/>
       </p:nvGrpSpPr>
-      <p:grpSpPr>
-        <a:xfrm>
-          <a:off x="0" y="0"/>
-          <a:ext cx="0" cy="0"/>
-          <a:chOff x="0" y="0"/>
-          <a:chExt cx="0" cy="0"/>
-        </a:xfrm>
-      </p:grpSpPr>
+      <p:grpSpPr/>
       <p:sp>
         <p:nvSpPr>
           <p:cNvPr id="2" name="Title 1"/>
@@ -3846,9 +3793,7 @@
         <p:txBody>
           <a:bodyPr/>
           <a:lstStyle/>
-          <a:p>
-            <a:endParaRPr/>
-          </a:p>
+          <a:p/>
         </p:txBody>
       </p:sp>
       <p:sp>
@@ -3887,7 +3832,6 @@
               </a:spcAft>
               <a:defRPr sz="1800"/>
             </a:pPr>
-            <a:endParaRPr/>
           </a:p>
           <a:p>
             <a:pPr>
@@ -3951,7 +3895,6 @@
               </a:spcAft>
               <a:defRPr sz="1800"/>
             </a:pPr>
-            <a:endParaRPr/>
           </a:p>
           <a:p>
             <a:pPr>
@@ -3971,7 +3914,6 @@
               </a:spcAft>
               <a:defRPr sz="1800"/>
             </a:pPr>
-            <a:endParaRPr/>
           </a:p>
           <a:p>
             <a:pPr>
@@ -3995,7 +3937,7 @@
 </file>
 
 <file path=ppt/slides/slide15.xml><?xml version="1.0" encoding="utf-8"?>
-<p:sld xmlns:a="http://schemas.openxmlformats.org/drawingml/2006/main" xmlns:r="http://schemas.openxmlformats.org/officeDocument/2006/relationships" xmlns:p="http://schemas.openxmlformats.org/presentationml/2006/main">
+<p:sld xmlns:a="http://schemas.openxmlformats.org/drawingml/2006/main" xmlns:p="http://schemas.openxmlformats.org/presentationml/2006/main" xmlns:r="http://schemas.openxmlformats.org/officeDocument/2006/relationships">
   <p:cSld>
     <p:spTree>
       <p:nvGrpSpPr>
@@ -4003,14 +3945,7 @@
         <p:cNvGrpSpPr/>
         <p:nvPr/>
       </p:nvGrpSpPr>
-      <p:grpSpPr>
-        <a:xfrm>
-          <a:off x="0" y="0"/>
-          <a:ext cx="0" cy="0"/>
-          <a:chOff x="0" y="0"/>
-          <a:chExt cx="0" cy="0"/>
-        </a:xfrm>
-      </p:grpSpPr>
+      <p:grpSpPr/>
       <p:sp>
         <p:nvSpPr>
           <p:cNvPr id="2" name="Title 1"/>
@@ -4053,9 +3988,7 @@
         <p:txBody>
           <a:bodyPr/>
           <a:lstStyle/>
-          <a:p>
-            <a:endParaRPr/>
-          </a:p>
+          <a:p/>
         </p:txBody>
       </p:sp>
       <p:sp>
@@ -4098,7 +4031,6 @@
               </a:spcAft>
               <a:defRPr sz="1800"/>
             </a:pPr>
-            <a:endParaRPr/>
           </a:p>
           <a:p>
             <a:pPr>
@@ -4140,7 +4072,6 @@
               </a:spcAft>
               <a:defRPr sz="1800"/>
             </a:pPr>
-            <a:endParaRPr/>
           </a:p>
           <a:p>
             <a:pPr>
@@ -4219,7 +4150,7 @@
 </file>
 
 <file path=ppt/slides/slide16.xml><?xml version="1.0" encoding="utf-8"?>
-<p:sld xmlns:a="http://schemas.openxmlformats.org/drawingml/2006/main" xmlns:r="http://schemas.openxmlformats.org/officeDocument/2006/relationships" xmlns:p="http://schemas.openxmlformats.org/presentationml/2006/main">
+<p:sld xmlns:a="http://schemas.openxmlformats.org/drawingml/2006/main" xmlns:p="http://schemas.openxmlformats.org/presentationml/2006/main" xmlns:r="http://schemas.openxmlformats.org/officeDocument/2006/relationships">
   <p:cSld>
     <p:spTree>
       <p:nvGrpSpPr>
@@ -4227,14 +4158,7 @@
         <p:cNvGrpSpPr/>
         <p:nvPr/>
       </p:nvGrpSpPr>
-      <p:grpSpPr>
-        <a:xfrm>
-          <a:off x="0" y="0"/>
-          <a:ext cx="0" cy="0"/>
-          <a:chOff x="0" y="0"/>
-          <a:chExt cx="0" cy="0"/>
-        </a:xfrm>
-      </p:grpSpPr>
+      <p:grpSpPr/>
       <p:sp>
         <p:nvSpPr>
           <p:cNvPr id="2" name="Title 1"/>
@@ -4363,7 +4287,7 @@
 </file>
 
 <file path=ppt/slides/slide17.xml><?xml version="1.0" encoding="utf-8"?>
-<p:sld xmlns:a="http://schemas.openxmlformats.org/drawingml/2006/main" xmlns:r="http://schemas.openxmlformats.org/officeDocument/2006/relationships" xmlns:p="http://schemas.openxmlformats.org/presentationml/2006/main">
+<p:sld xmlns:a="http://schemas.openxmlformats.org/drawingml/2006/main" xmlns:p="http://schemas.openxmlformats.org/presentationml/2006/main" xmlns:r="http://schemas.openxmlformats.org/officeDocument/2006/relationships">
   <p:cSld>
     <p:spTree>
       <p:nvGrpSpPr>
@@ -4371,14 +4295,7 @@
         <p:cNvGrpSpPr/>
         <p:nvPr/>
       </p:nvGrpSpPr>
-      <p:grpSpPr>
-        <a:xfrm>
-          <a:off x="0" y="0"/>
-          <a:ext cx="0" cy="0"/>
-          <a:chOff x="0" y="0"/>
-          <a:chExt cx="0" cy="0"/>
-        </a:xfrm>
-      </p:grpSpPr>
+      <p:grpSpPr/>
       <p:sp>
         <p:nvSpPr>
           <p:cNvPr id="2" name="Title 1"/>
@@ -4439,7 +4356,6 @@
               </a:spcAft>
               <a:defRPr sz="1800"/>
             </a:pPr>
-            <a:endParaRPr/>
           </a:p>
           <a:p>
             <a:pPr>
@@ -4477,7 +4393,7 @@
             </a:r>
           </a:p>
           <a:p>
-            <a:endParaRPr/>
+            <a:pPr/>
           </a:p>
           <a:p>
             <a:pPr>
@@ -4510,7 +4426,7 @@
 </file>
 
 <file path=ppt/slides/slide18.xml><?xml version="1.0" encoding="utf-8"?>
-<p:sld xmlns:a="http://schemas.openxmlformats.org/drawingml/2006/main" xmlns:r="http://schemas.openxmlformats.org/officeDocument/2006/relationships" xmlns:p="http://schemas.openxmlformats.org/presentationml/2006/main">
+<p:sld xmlns:a="http://schemas.openxmlformats.org/drawingml/2006/main" xmlns:p="http://schemas.openxmlformats.org/presentationml/2006/main" xmlns:r="http://schemas.openxmlformats.org/officeDocument/2006/relationships">
   <p:cSld>
     <p:spTree>
       <p:nvGrpSpPr>
@@ -4518,14 +4434,7 @@
         <p:cNvGrpSpPr/>
         <p:nvPr/>
       </p:nvGrpSpPr>
-      <p:grpSpPr>
-        <a:xfrm>
-          <a:off x="0" y="0"/>
-          <a:ext cx="0" cy="0"/>
-          <a:chOff x="0" y="0"/>
-          <a:chExt cx="0" cy="0"/>
-        </a:xfrm>
-      </p:grpSpPr>
+      <p:grpSpPr/>
       <p:sp>
         <p:nvSpPr>
           <p:cNvPr id="2" name="Title 1"/>
@@ -4576,62 +4485,92 @@
               <a:defRPr sz="1800"/>
             </a:pPr>
             <a:r>
-              <a:t>Single dataset evaluation (Breast Cancer Wisconsin only)</a:t>
-            </a:r>
-          </a:p>
-          <a:p>
-            <a:pPr>
-              <a:spcAft>
-                <a:spcPts val="1200"/>
-              </a:spcAft>
-              <a:defRPr sz="1800"/>
-            </a:pPr>
-            <a:r>
-              <a:t>DIO optimization time not quantified or compared</a:t>
-            </a:r>
-          </a:p>
-          <a:p>
-            <a:pPr>
-              <a:spcAft>
-                <a:spcPts val="1200"/>
-              </a:spcAft>
-              <a:defRPr sz="1800"/>
-            </a:pPr>
-            <a:r>
-              <a:t>Feature selection stability not assessed across multiple runs</a:t>
-            </a:r>
-          </a:p>
-          <a:p>
-            <a:pPr>
-              <a:spcAft>
-                <a:spcPts val="1200"/>
-              </a:spcAft>
-              <a:defRPr sz="1800"/>
-            </a:pPr>
-            <a:r>
-              <a:t>Limited hyperparameter space (4 RF parameters)</a:t>
-            </a:r>
-          </a:p>
-          <a:p>
-            <a:pPr>
-              <a:spcAft>
-                <a:spcPts val="1200"/>
-              </a:spcAft>
-              <a:defRPr sz="1800"/>
-            </a:pPr>
-            <a:r>
-              <a:t>No comparison with other metaheuristics (PSO, GA, ACO)</a:t>
-            </a:r>
-          </a:p>
-          <a:p>
-            <a:pPr>
-              <a:spcAft>
-                <a:spcPts val="1200"/>
-              </a:spcAft>
-              <a:defRPr sz="1800"/>
-            </a:pPr>
-            <a:r>
-              <a:t>Domain-specific: 73% reduction may not generalize to all problems</a:t>
+              <a:t>⚠ Single-split hyperparameter optimization (random_state=42)</a:t>
+            </a:r>
+          </a:p>
+          <a:p>
+            <a:pPr>
+              <a:spcAft>
+                <a:spcPts val="1200"/>
+              </a:spcAft>
+              <a:defRPr sz="1800"/>
+            </a:pPr>
+            <a:r>
+              <a:t>  → Led to 'optimization overfitting' - tuned params don't generalize</a:t>
+            </a:r>
+          </a:p>
+          <a:p>
+            <a:pPr>
+              <a:spcAft>
+                <a:spcPts val="1200"/>
+              </a:spcAft>
+              <a:defRPr sz="1800"/>
+            </a:pPr>
+            <a:r>
+              <a:t>  → Future: Use k-fold CV during DIO optimization, not just evaluation</a:t>
+            </a:r>
+          </a:p>
+          <a:p>
+            <a:pPr>
+              <a:spcAft>
+                <a:spcPts val="1200"/>
+              </a:spcAft>
+              <a:defRPr sz="1800"/>
+            </a:pPr>
+          </a:p>
+          <a:p>
+            <a:pPr>
+              <a:spcAft>
+                <a:spcPts val="1200"/>
+              </a:spcAft>
+              <a:defRPr sz="1800"/>
+            </a:pPr>
+            <a:r>
+              <a:t>• Single dataset evaluation (Breast Cancer Wisconsin only)</a:t>
+            </a:r>
+          </a:p>
+          <a:p>
+            <a:pPr>
+              <a:spcAft>
+                <a:spcPts val="1200"/>
+              </a:spcAft>
+              <a:defRPr sz="1800"/>
+            </a:pPr>
+            <a:r>
+              <a:t>• DIO optimization time not quantified or compared</a:t>
+            </a:r>
+          </a:p>
+          <a:p>
+            <a:pPr>
+              <a:spcAft>
+                <a:spcPts val="1200"/>
+              </a:spcAft>
+              <a:defRPr sz="1800"/>
+            </a:pPr>
+            <a:r>
+              <a:t>• Feature selection stability not assessed across multiple runs</a:t>
+            </a:r>
+          </a:p>
+          <a:p>
+            <a:pPr>
+              <a:spcAft>
+                <a:spcPts val="1200"/>
+              </a:spcAft>
+              <a:defRPr sz="1800"/>
+            </a:pPr>
+            <a:r>
+              <a:t>• Limited hyperparameter space (4 RF parameters)</a:t>
+            </a:r>
+          </a:p>
+          <a:p>
+            <a:pPr>
+              <a:spcAft>
+                <a:spcPts val="1200"/>
+              </a:spcAft>
+              <a:defRPr sz="1800"/>
+            </a:pPr>
+            <a:r>
+              <a:t>• No comparison with other metaheuristics (PSO, GA, ACO)</a:t>
             </a:r>
           </a:p>
         </p:txBody>
@@ -4645,7 +4584,7 @@
 </file>
 
 <file path=ppt/slides/slide19.xml><?xml version="1.0" encoding="utf-8"?>
-<p:sld xmlns:a="http://schemas.openxmlformats.org/drawingml/2006/main" xmlns:r="http://schemas.openxmlformats.org/officeDocument/2006/relationships" xmlns:p="http://schemas.openxmlformats.org/presentationml/2006/main">
+<p:sld xmlns:a="http://schemas.openxmlformats.org/drawingml/2006/main" xmlns:p="http://schemas.openxmlformats.org/presentationml/2006/main" xmlns:r="http://schemas.openxmlformats.org/officeDocument/2006/relationships">
   <p:cSld>
     <p:spTree>
       <p:nvGrpSpPr>
@@ -4653,14 +4592,7 @@
         <p:cNvGrpSpPr/>
         <p:nvPr/>
       </p:nvGrpSpPr>
-      <p:grpSpPr>
-        <a:xfrm>
-          <a:off x="0" y="0"/>
-          <a:ext cx="0" cy="0"/>
-          <a:chOff x="0" y="0"/>
-          <a:chExt cx="0" cy="0"/>
-        </a:xfrm>
-      </p:grpSpPr>
+      <p:grpSpPr/>
       <p:sp>
         <p:nvSpPr>
           <p:cNvPr id="2" name="Title 1"/>
@@ -4711,73 +4643,92 @@
               <a:defRPr sz="1800"/>
             </a:pPr>
             <a:r>
-              <a:t>Multi-dataset validation (lung cancer, diabetes, heart disease)</a:t>
-            </a:r>
-          </a:p>
-          <a:p>
-            <a:pPr>
-              <a:spcAft>
-                <a:spcPts val="1200"/>
-              </a:spcAft>
-              <a:defRPr sz="1800"/>
-            </a:pPr>
-            <a:r>
-              <a:t>Benchmark against other metaheuristics (PSO, GA, ACO)</a:t>
-            </a:r>
-          </a:p>
-          <a:p>
-            <a:pPr>
-              <a:spcAft>
-                <a:spcPts val="1200"/>
-              </a:spcAft>
-              <a:defRPr sz="1800"/>
-            </a:pPr>
-            <a:r>
-              <a:t>Extend to other classifiers (XGBoost, neural networks)</a:t>
-            </a:r>
-          </a:p>
-          <a:p>
-            <a:pPr>
-              <a:spcAft>
-                <a:spcPts val="1200"/>
-              </a:spcAft>
-              <a:defRPr sz="1800"/>
-            </a:pPr>
-            <a:r>
-              <a:t>Feature selection stability analysis</a:t>
-            </a:r>
-          </a:p>
-          <a:p>
-            <a:pPr>
-              <a:spcAft>
-                <a:spcPts val="1200"/>
-              </a:spcAft>
-              <a:defRPr sz="1800"/>
-            </a:pPr>
-            <a:r>
-              <a:t>Computational profiling and parallelization</a:t>
-            </a:r>
-          </a:p>
-          <a:p>
-            <a:pPr>
-              <a:spcAft>
-                <a:spcPts val="1200"/>
-              </a:spcAft>
-              <a:defRPr sz="1800"/>
-            </a:pPr>
-            <a:r>
-              <a:t>Real-world clinical deployment and prospective validation</a:t>
-            </a:r>
-          </a:p>
-          <a:p>
-            <a:pPr>
-              <a:spcAft>
-                <a:spcPts val="1200"/>
-              </a:spcAft>
-              <a:defRPr sz="1800"/>
-            </a:pPr>
-            <a:r>
-              <a:t>Hybrid approaches combining DIO with domain knowledge</a:t>
+              <a:t>1. Cross-validated hyperparameter optimization (PRIORITY)</a:t>
+            </a:r>
+          </a:p>
+          <a:p>
+            <a:pPr>
+              <a:spcAft>
+                <a:spcPts val="1200"/>
+              </a:spcAft>
+              <a:defRPr sz="1800"/>
+            </a:pPr>
+            <a:r>
+              <a:t>  → Use k-fold CV within DIO fitness evaluation</a:t>
+            </a:r>
+          </a:p>
+          <a:p>
+            <a:pPr>
+              <a:spcAft>
+                <a:spcPts val="1200"/>
+              </a:spcAft>
+              <a:defRPr sz="1800"/>
+            </a:pPr>
+            <a:r>
+              <a:t>  → Ensure hyperparameters generalize across data partitions</a:t>
+            </a:r>
+          </a:p>
+          <a:p>
+            <a:pPr>
+              <a:spcAft>
+                <a:spcPts val="1200"/>
+              </a:spcAft>
+              <a:defRPr sz="1800"/>
+            </a:pPr>
+          </a:p>
+          <a:p>
+            <a:pPr>
+              <a:spcAft>
+                <a:spcPts val="1200"/>
+              </a:spcAft>
+              <a:defRPr sz="1800"/>
+            </a:pPr>
+            <a:r>
+              <a:t>2. Multi-dataset validation (lung cancer, diabetes, heart disease)</a:t>
+            </a:r>
+          </a:p>
+          <a:p>
+            <a:pPr>
+              <a:spcAft>
+                <a:spcPts val="1200"/>
+              </a:spcAft>
+              <a:defRPr sz="1800"/>
+            </a:pPr>
+            <a:r>
+              <a:t>3. Benchmark against other metaheuristics (PSO, GA, ACO)</a:t>
+            </a:r>
+          </a:p>
+          <a:p>
+            <a:pPr>
+              <a:spcAft>
+                <a:spcPts val="1200"/>
+              </a:spcAft>
+              <a:defRPr sz="1800"/>
+            </a:pPr>
+            <a:r>
+              <a:t>4. Extend to other classifiers (XGBoost, neural networks)</a:t>
+            </a:r>
+          </a:p>
+          <a:p>
+            <a:pPr>
+              <a:spcAft>
+                <a:spcPts val="1200"/>
+              </a:spcAft>
+              <a:defRPr sz="1800"/>
+            </a:pPr>
+            <a:r>
+              <a:t>5. Feature selection stability analysis</a:t>
+            </a:r>
+          </a:p>
+          <a:p>
+            <a:pPr>
+              <a:spcAft>
+                <a:spcPts val="1200"/>
+              </a:spcAft>
+              <a:defRPr sz="1800"/>
+            </a:pPr>
+            <a:r>
+              <a:t>6. Real-world clinical deployment and prospective validation</a:t>
             </a:r>
           </a:p>
         </p:txBody>
@@ -4791,7 +4742,7 @@
 </file>
 
 <file path=ppt/slides/slide2.xml><?xml version="1.0" encoding="utf-8"?>
-<p:sld xmlns:a="http://schemas.openxmlformats.org/drawingml/2006/main" xmlns:r="http://schemas.openxmlformats.org/officeDocument/2006/relationships" xmlns:p="http://schemas.openxmlformats.org/presentationml/2006/main">
+<p:sld xmlns:a="http://schemas.openxmlformats.org/drawingml/2006/main" xmlns:p="http://schemas.openxmlformats.org/presentationml/2006/main" xmlns:r="http://schemas.openxmlformats.org/officeDocument/2006/relationships">
   <p:cSld>
     <p:spTree>
       <p:nvGrpSpPr>
@@ -4799,14 +4750,7 @@
         <p:cNvGrpSpPr/>
         <p:nvPr/>
       </p:nvGrpSpPr>
-      <p:grpSpPr>
-        <a:xfrm>
-          <a:off x="0" y="0"/>
-          <a:ext cx="0" cy="0"/>
-          <a:chOff x="0" y="0"/>
-          <a:chExt cx="0" cy="0"/>
-        </a:xfrm>
-      </p:grpSpPr>
+      <p:grpSpPr/>
       <p:sp>
         <p:nvSpPr>
           <p:cNvPr id="2" name="Title 1"/>
@@ -4959,7 +4903,7 @@
 </file>
 
 <file path=ppt/slides/slide20.xml><?xml version="1.0" encoding="utf-8"?>
-<p:sld xmlns:a="http://schemas.openxmlformats.org/drawingml/2006/main" xmlns:r="http://schemas.openxmlformats.org/officeDocument/2006/relationships" xmlns:p="http://schemas.openxmlformats.org/presentationml/2006/main">
+<p:sld xmlns:a="http://schemas.openxmlformats.org/drawingml/2006/main" xmlns:p="http://schemas.openxmlformats.org/presentationml/2006/main" xmlns:r="http://schemas.openxmlformats.org/officeDocument/2006/relationships">
   <p:cSld>
     <p:spTree>
       <p:nvGrpSpPr>
@@ -4967,14 +4911,7 @@
         <p:cNvGrpSpPr/>
         <p:nvPr/>
       </p:nvGrpSpPr>
-      <p:grpSpPr>
-        <a:xfrm>
-          <a:off x="0" y="0"/>
-          <a:ext cx="0" cy="0"/>
-          <a:chOff x="0" y="0"/>
-          <a:chExt cx="0" cy="0"/>
-        </a:xfrm>
-      </p:grpSpPr>
+      <p:grpSpPr/>
       <p:sp>
         <p:nvSpPr>
           <p:cNvPr id="2" name="Title 1"/>
@@ -5105,7 +5042,7 @@
 </file>
 
 <file path=ppt/slides/slide21.xml><?xml version="1.0" encoding="utf-8"?>
-<p:sld xmlns:a="http://schemas.openxmlformats.org/drawingml/2006/main" xmlns:r="http://schemas.openxmlformats.org/officeDocument/2006/relationships" xmlns:p="http://schemas.openxmlformats.org/presentationml/2006/main">
+<p:sld xmlns:a="http://schemas.openxmlformats.org/drawingml/2006/main" xmlns:p="http://schemas.openxmlformats.org/presentationml/2006/main" xmlns:r="http://schemas.openxmlformats.org/officeDocument/2006/relationships">
   <p:cSld>
     <p:spTree>
       <p:nvGrpSpPr>
@@ -5113,14 +5050,7 @@
         <p:cNvGrpSpPr/>
         <p:nvPr/>
       </p:nvGrpSpPr>
-      <p:grpSpPr>
-        <a:xfrm>
-          <a:off x="0" y="0"/>
-          <a:ext cx="0" cy="0"/>
-          <a:chOff x="0" y="0"/>
-          <a:chExt cx="0" cy="0"/>
-        </a:xfrm>
-      </p:grpSpPr>
+      <p:grpSpPr/>
       <p:sp>
         <p:nvSpPr>
           <p:cNvPr id="2" name="Title 1"/>
@@ -5163,9 +5093,7 @@
         <p:txBody>
           <a:bodyPr/>
           <a:lstStyle/>
-          <a:p>
-            <a:endParaRPr/>
-          </a:p>
+          <a:p/>
         </p:txBody>
       </p:sp>
       <p:sp>
@@ -5207,7 +5135,6 @@
               </a:spcAft>
               <a:defRPr sz="2000"/>
             </a:pPr>
-            <a:endParaRPr/>
           </a:p>
           <a:p>
             <a:pPr>
@@ -5260,7 +5187,6 @@
               </a:spcAft>
               <a:defRPr sz="2000"/>
             </a:pPr>
-            <a:endParaRPr/>
           </a:p>
           <a:p>
             <a:pPr>
@@ -5280,7 +5206,6 @@
               </a:spcAft>
               <a:defRPr sz="2000"/>
             </a:pPr>
-            <a:endParaRPr/>
           </a:p>
           <a:p>
             <a:pPr>
@@ -5304,7 +5229,7 @@
 </file>
 
 <file path=ppt/slides/slide22.xml><?xml version="1.0" encoding="utf-8"?>
-<p:sld xmlns:a="http://schemas.openxmlformats.org/drawingml/2006/main" xmlns:r="http://schemas.openxmlformats.org/officeDocument/2006/relationships" xmlns:p="http://schemas.openxmlformats.org/presentationml/2006/main">
+<p:sld xmlns:a="http://schemas.openxmlformats.org/drawingml/2006/main" xmlns:p="http://schemas.openxmlformats.org/presentationml/2006/main" xmlns:r="http://schemas.openxmlformats.org/officeDocument/2006/relationships">
   <p:cSld>
     <p:spTree>
       <p:nvGrpSpPr>
@@ -5312,14 +5237,7 @@
         <p:cNvGrpSpPr/>
         <p:nvPr/>
       </p:nvGrpSpPr>
-      <p:grpSpPr>
-        <a:xfrm>
-          <a:off x="0" y="0"/>
-          <a:ext cx="0" cy="0"/>
-          <a:chOff x="0" y="0"/>
-          <a:chExt cx="0" cy="0"/>
-        </a:xfrm>
-      </p:grpSpPr>
+      <p:grpSpPr/>
       <p:sp>
         <p:nvSpPr>
           <p:cNvPr id="2" name="TextBox 1"/>
@@ -5416,16 +5334,7 @@
               <a:defRPr sz="1800"/>
             </a:pPr>
             <a:r>
-              <a:rPr dirty="0"/>
-              <a:t>GitHub: amine-dubs/</a:t>
-            </a:r>
-            <a:r>
-              <a:rPr dirty="0" err="1"/>
-              <a:t>dio</a:t>
-            </a:r>
-            <a:r>
-              <a:rPr dirty="0"/>
-              <a:t>-optimization</a:t>
+              <a:t>GitHub: amine-dubs/dio-optimization</a:t>
             </a:r>
           </a:p>
           <a:p>
@@ -5433,21 +5342,14 @@
               <a:defRPr sz="1800"/>
             </a:pPr>
             <a:r>
-              <a:rPr dirty="0" smtClean="0"/>
-              <a:t>Email:</a:t>
-            </a:r>
-            <a:r>
-              <a:rPr lang="fr-FR" dirty="0"/>
-              <a:t>222237259301@etu.univ-usto.dz</a:t>
-            </a:r>
-            <a:endParaRPr dirty="0"/>
+              <a:t>Email: your.email@university.edu</a:t>
+            </a:r>
           </a:p>
           <a:p>
             <a:pPr algn="ctr">
               <a:defRPr sz="1800"/>
             </a:pPr>
             <a:r>
-              <a:rPr dirty="0"/>
               <a:t>Dataset: UCI Machine Learning Repository</a:t>
             </a:r>
           </a:p>
@@ -5462,7 +5364,7 @@
 </file>
 
 <file path=ppt/slides/slide3.xml><?xml version="1.0" encoding="utf-8"?>
-<p:sld xmlns:a="http://schemas.openxmlformats.org/drawingml/2006/main" xmlns:r="http://schemas.openxmlformats.org/officeDocument/2006/relationships" xmlns:p="http://schemas.openxmlformats.org/presentationml/2006/main">
+<p:sld xmlns:a="http://schemas.openxmlformats.org/drawingml/2006/main" xmlns:p="http://schemas.openxmlformats.org/presentationml/2006/main" xmlns:r="http://schemas.openxmlformats.org/officeDocument/2006/relationships">
   <p:cSld>
     <p:spTree>
       <p:nvGrpSpPr>
@@ -5470,14 +5372,7 @@
         <p:cNvGrpSpPr/>
         <p:nvPr/>
       </p:nvGrpSpPr>
-      <p:grpSpPr>
-        <a:xfrm>
-          <a:off x="0" y="0"/>
-          <a:ext cx="0" cy="0"/>
-          <a:chOff x="0" y="0"/>
-          <a:chExt cx="0" cy="0"/>
-        </a:xfrm>
-      </p:grpSpPr>
+      <p:grpSpPr/>
       <p:sp>
         <p:nvSpPr>
           <p:cNvPr id="2" name="Title 1"/>
@@ -5586,7 +5481,7 @@
 </file>
 
 <file path=ppt/slides/slide4.xml><?xml version="1.0" encoding="utf-8"?>
-<p:sld xmlns:a="http://schemas.openxmlformats.org/drawingml/2006/main" xmlns:r="http://schemas.openxmlformats.org/officeDocument/2006/relationships" xmlns:p="http://schemas.openxmlformats.org/presentationml/2006/main">
+<p:sld xmlns:a="http://schemas.openxmlformats.org/drawingml/2006/main" xmlns:p="http://schemas.openxmlformats.org/presentationml/2006/main" xmlns:r="http://schemas.openxmlformats.org/officeDocument/2006/relationships">
   <p:cSld>
     <p:spTree>
       <p:nvGrpSpPr>
@@ -5594,14 +5489,7 @@
         <p:cNvGrpSpPr/>
         <p:nvPr/>
       </p:nvGrpSpPr>
-      <p:grpSpPr>
-        <a:xfrm>
-          <a:off x="0" y="0"/>
-          <a:ext cx="0" cy="0"/>
-          <a:chOff x="0" y="0"/>
-          <a:chExt cx="0" cy="0"/>
-        </a:xfrm>
-      </p:grpSpPr>
+      <p:grpSpPr/>
       <p:sp>
         <p:nvSpPr>
           <p:cNvPr id="2" name="Title 1"/>
@@ -5720,7 +5608,7 @@
 </file>
 
 <file path=ppt/slides/slide5.xml><?xml version="1.0" encoding="utf-8"?>
-<p:sld xmlns:a="http://schemas.openxmlformats.org/drawingml/2006/main" xmlns:r="http://schemas.openxmlformats.org/officeDocument/2006/relationships" xmlns:p="http://schemas.openxmlformats.org/presentationml/2006/main">
+<p:sld xmlns:a="http://schemas.openxmlformats.org/drawingml/2006/main" xmlns:p="http://schemas.openxmlformats.org/presentationml/2006/main" xmlns:r="http://schemas.openxmlformats.org/officeDocument/2006/relationships">
   <p:cSld>
     <p:spTree>
       <p:nvGrpSpPr>
@@ -5728,14 +5616,7 @@
         <p:cNvGrpSpPr/>
         <p:nvPr/>
       </p:nvGrpSpPr>
-      <p:grpSpPr>
-        <a:xfrm>
-          <a:off x="0" y="0"/>
-          <a:ext cx="0" cy="0"/>
-          <a:chOff x="0" y="0"/>
-          <a:chExt cx="0" cy="0"/>
-        </a:xfrm>
-      </p:grpSpPr>
+      <p:grpSpPr/>
       <p:sp>
         <p:nvSpPr>
           <p:cNvPr id="2" name="Title 1"/>
@@ -5796,7 +5677,6 @@
               </a:spcAft>
               <a:defRPr sz="1800"/>
             </a:pPr>
-            <a:endParaRPr/>
           </a:p>
           <a:p>
             <a:pPr>
@@ -5838,7 +5718,6 @@
               </a:spcAft>
               <a:defRPr sz="1800"/>
             </a:pPr>
-            <a:endParaRPr/>
           </a:p>
           <a:p>
             <a:pPr>
@@ -5858,7 +5737,6 @@
               </a:spcAft>
               <a:defRPr sz="1800"/>
             </a:pPr>
-            <a:endParaRPr/>
           </a:p>
           <a:p>
             <a:pPr>
@@ -5882,7 +5760,7 @@
 </file>
 
 <file path=ppt/slides/slide6.xml><?xml version="1.0" encoding="utf-8"?>
-<p:sld xmlns:a="http://schemas.openxmlformats.org/drawingml/2006/main" xmlns:r="http://schemas.openxmlformats.org/officeDocument/2006/relationships" xmlns:p="http://schemas.openxmlformats.org/presentationml/2006/main">
+<p:sld xmlns:a="http://schemas.openxmlformats.org/drawingml/2006/main" xmlns:p="http://schemas.openxmlformats.org/presentationml/2006/main" xmlns:r="http://schemas.openxmlformats.org/officeDocument/2006/relationships">
   <p:cSld>
     <p:spTree>
       <p:nvGrpSpPr>
@@ -5890,14 +5768,7 @@
         <p:cNvGrpSpPr/>
         <p:nvPr/>
       </p:nvGrpSpPr>
-      <p:grpSpPr>
-        <a:xfrm>
-          <a:off x="0" y="0"/>
-          <a:ext cx="0" cy="0"/>
-          <a:chOff x="0" y="0"/>
-          <a:chExt cx="0" cy="0"/>
-        </a:xfrm>
-      </p:grpSpPr>
+      <p:grpSpPr/>
       <p:sp>
         <p:nvSpPr>
           <p:cNvPr id="2" name="Title 1"/>
@@ -5910,9 +5781,7 @@
         </p:nvSpPr>
         <p:spPr/>
         <p:txBody>
-          <a:bodyPr>
-            <a:normAutofit fontScale="90000"/>
-          </a:bodyPr>
+          <a:bodyPr/>
           <a:lstStyle/>
           <a:p>
             <a:pPr>
@@ -6012,7 +5881,7 @@
 </file>
 
 <file path=ppt/slides/slide7.xml><?xml version="1.0" encoding="utf-8"?>
-<p:sld xmlns:a="http://schemas.openxmlformats.org/drawingml/2006/main" xmlns:r="http://schemas.openxmlformats.org/officeDocument/2006/relationships" xmlns:p="http://schemas.openxmlformats.org/presentationml/2006/main">
+<p:sld xmlns:a="http://schemas.openxmlformats.org/drawingml/2006/main" xmlns:p="http://schemas.openxmlformats.org/presentationml/2006/main" xmlns:r="http://schemas.openxmlformats.org/officeDocument/2006/relationships">
   <p:cSld>
     <p:spTree>
       <p:nvGrpSpPr>
@@ -6020,14 +5889,7 @@
         <p:cNvGrpSpPr/>
         <p:nvPr/>
       </p:nvGrpSpPr>
-      <p:grpSpPr>
-        <a:xfrm>
-          <a:off x="0" y="0"/>
-          <a:ext cx="0" cy="0"/>
-          <a:chOff x="0" y="0"/>
-          <a:chExt cx="0" cy="0"/>
-        </a:xfrm>
-      </p:grpSpPr>
+      <p:grpSpPr/>
       <p:sp>
         <p:nvSpPr>
           <p:cNvPr id="2" name="Title 1"/>
@@ -6070,9 +5932,7 @@
         <p:txBody>
           <a:bodyPr/>
           <a:lstStyle/>
-          <a:p>
-            <a:endParaRPr/>
-          </a:p>
+          <a:p/>
         </p:txBody>
       </p:sp>
       <p:sp>
@@ -6182,7 +6042,7 @@
 </file>
 
 <file path=ppt/slides/slide8.xml><?xml version="1.0" encoding="utf-8"?>
-<p:sld xmlns:a="http://schemas.openxmlformats.org/drawingml/2006/main" xmlns:r="http://schemas.openxmlformats.org/officeDocument/2006/relationships" xmlns:p="http://schemas.openxmlformats.org/presentationml/2006/main">
+<p:sld xmlns:a="http://schemas.openxmlformats.org/drawingml/2006/main" xmlns:p="http://schemas.openxmlformats.org/presentationml/2006/main" xmlns:r="http://schemas.openxmlformats.org/officeDocument/2006/relationships">
   <p:cSld>
     <p:spTree>
       <p:nvGrpSpPr>
@@ -6190,14 +6050,7 @@
         <p:cNvGrpSpPr/>
         <p:nvPr/>
       </p:nvGrpSpPr>
-      <p:grpSpPr>
-        <a:xfrm>
-          <a:off x="0" y="0"/>
-          <a:ext cx="0" cy="0"/>
-          <a:chOff x="0" y="0"/>
-          <a:chExt cx="0" cy="0"/>
-        </a:xfrm>
-      </p:grpSpPr>
+      <p:grpSpPr/>
       <p:sp>
         <p:nvSpPr>
           <p:cNvPr id="2" name="Title 1"/>
@@ -6318,7 +6171,7 @@
 </file>
 
 <file path=ppt/slides/slide9.xml><?xml version="1.0" encoding="utf-8"?>
-<p:sld xmlns:a="http://schemas.openxmlformats.org/drawingml/2006/main" xmlns:r="http://schemas.openxmlformats.org/officeDocument/2006/relationships" xmlns:p="http://schemas.openxmlformats.org/presentationml/2006/main">
+<p:sld xmlns:a="http://schemas.openxmlformats.org/drawingml/2006/main" xmlns:p="http://schemas.openxmlformats.org/presentationml/2006/main" xmlns:r="http://schemas.openxmlformats.org/officeDocument/2006/relationships">
   <p:cSld>
     <p:spTree>
       <p:nvGrpSpPr>
@@ -6326,14 +6179,7 @@
         <p:cNvGrpSpPr/>
         <p:nvPr/>
       </p:nvGrpSpPr>
-      <p:grpSpPr>
-        <a:xfrm>
-          <a:off x="0" y="0"/>
-          <a:ext cx="0" cy="0"/>
-          <a:chOff x="0" y="0"/>
-          <a:chExt cx="0" cy="0"/>
-        </a:xfrm>
-      </p:grpSpPr>
+      <p:grpSpPr/>
       <p:sp>
         <p:nvSpPr>
           <p:cNvPr id="2" name="Title 1"/>
@@ -6376,9 +6222,7 @@
         <p:txBody>
           <a:bodyPr/>
           <a:lstStyle/>
-          <a:p>
-            <a:endParaRPr/>
-          </a:p>
+          <a:p/>
         </p:txBody>
       </p:sp>
       <p:sp>
@@ -6455,10 +6299,14 @@
             </a:r>
           </a:p>
           <a:p>
-            <a:r>
-              <a:t/>
-            </a:r>
             <a:br/>
+            <a:pPr>
+              <a:defRPr sz="2200" b="1">
+                <a:solidFill>
+                  <a:srgbClr val="2ECC71"/>
+                </a:solidFill>
+              </a:defRPr>
+            </a:pPr>
             <a:r>
               <a:t>Selected Features: 8 out of 30 (73% reduction!)</a:t>
             </a:r>

</xml_diff>